<commit_message>
Build Errors and updated request details in postman
</commit_message>
<xml_diff>
--- a/mytrip-docs/FlowDiagram.pptx
+++ b/mytrip-docs/FlowDiagram.pptx
@@ -243,7 +243,7 @@
           <a:p>
             <a:fld id="{8B36BD8D-A58E-488B-AE33-89487DD73892}" type="datetimeFigureOut">
               <a:rPr lang="en-IN" smtClean="0"/>
-              <a:t>04-07-2017</a:t>
+              <a:t>05-07-2017</a:t>
             </a:fld>
             <a:endParaRPr lang="en-IN"/>
           </a:p>
@@ -413,7 +413,7 @@
           <a:p>
             <a:fld id="{8B36BD8D-A58E-488B-AE33-89487DD73892}" type="datetimeFigureOut">
               <a:rPr lang="en-IN" smtClean="0"/>
-              <a:t>04-07-2017</a:t>
+              <a:t>05-07-2017</a:t>
             </a:fld>
             <a:endParaRPr lang="en-IN"/>
           </a:p>
@@ -593,7 +593,7 @@
           <a:p>
             <a:fld id="{8B36BD8D-A58E-488B-AE33-89487DD73892}" type="datetimeFigureOut">
               <a:rPr lang="en-IN" smtClean="0"/>
-              <a:t>04-07-2017</a:t>
+              <a:t>05-07-2017</a:t>
             </a:fld>
             <a:endParaRPr lang="en-IN"/>
           </a:p>
@@ -763,7 +763,7 @@
           <a:p>
             <a:fld id="{8B36BD8D-A58E-488B-AE33-89487DD73892}" type="datetimeFigureOut">
               <a:rPr lang="en-IN" smtClean="0"/>
-              <a:t>04-07-2017</a:t>
+              <a:t>05-07-2017</a:t>
             </a:fld>
             <a:endParaRPr lang="en-IN"/>
           </a:p>
@@ -1009,7 +1009,7 @@
           <a:p>
             <a:fld id="{8B36BD8D-A58E-488B-AE33-89487DD73892}" type="datetimeFigureOut">
               <a:rPr lang="en-IN" smtClean="0"/>
-              <a:t>04-07-2017</a:t>
+              <a:t>05-07-2017</a:t>
             </a:fld>
             <a:endParaRPr lang="en-IN"/>
           </a:p>
@@ -1241,7 +1241,7 @@
           <a:p>
             <a:fld id="{8B36BD8D-A58E-488B-AE33-89487DD73892}" type="datetimeFigureOut">
               <a:rPr lang="en-IN" smtClean="0"/>
-              <a:t>04-07-2017</a:t>
+              <a:t>05-07-2017</a:t>
             </a:fld>
             <a:endParaRPr lang="en-IN"/>
           </a:p>
@@ -1608,7 +1608,7 @@
           <a:p>
             <a:fld id="{8B36BD8D-A58E-488B-AE33-89487DD73892}" type="datetimeFigureOut">
               <a:rPr lang="en-IN" smtClean="0"/>
-              <a:t>04-07-2017</a:t>
+              <a:t>05-07-2017</a:t>
             </a:fld>
             <a:endParaRPr lang="en-IN"/>
           </a:p>
@@ -1726,7 +1726,7 @@
           <a:p>
             <a:fld id="{8B36BD8D-A58E-488B-AE33-89487DD73892}" type="datetimeFigureOut">
               <a:rPr lang="en-IN" smtClean="0"/>
-              <a:t>04-07-2017</a:t>
+              <a:t>05-07-2017</a:t>
             </a:fld>
             <a:endParaRPr lang="en-IN"/>
           </a:p>
@@ -1821,7 +1821,7 @@
           <a:p>
             <a:fld id="{8B36BD8D-A58E-488B-AE33-89487DD73892}" type="datetimeFigureOut">
               <a:rPr lang="en-IN" smtClean="0"/>
-              <a:t>04-07-2017</a:t>
+              <a:t>05-07-2017</a:t>
             </a:fld>
             <a:endParaRPr lang="en-IN"/>
           </a:p>
@@ -2098,7 +2098,7 @@
           <a:p>
             <a:fld id="{8B36BD8D-A58E-488B-AE33-89487DD73892}" type="datetimeFigureOut">
               <a:rPr lang="en-IN" smtClean="0"/>
-              <a:t>04-07-2017</a:t>
+              <a:t>05-07-2017</a:t>
             </a:fld>
             <a:endParaRPr lang="en-IN"/>
           </a:p>
@@ -2351,7 +2351,7 @@
           <a:p>
             <a:fld id="{8B36BD8D-A58E-488B-AE33-89487DD73892}" type="datetimeFigureOut">
               <a:rPr lang="en-IN" smtClean="0"/>
-              <a:t>04-07-2017</a:t>
+              <a:t>05-07-2017</a:t>
             </a:fld>
             <a:endParaRPr lang="en-IN"/>
           </a:p>
@@ -2564,7 +2564,7 @@
           <a:p>
             <a:fld id="{8B36BD8D-A58E-488B-AE33-89487DD73892}" type="datetimeFigureOut">
               <a:rPr lang="en-IN" smtClean="0"/>
-              <a:t>04-07-2017</a:t>
+              <a:t>05-07-2017</a:t>
             </a:fld>
             <a:endParaRPr lang="en-IN"/>
           </a:p>
@@ -3223,6 +3223,9 @@
           <a:prstGeom prst="roundRect">
             <a:avLst/>
           </a:prstGeom>
+          <a:solidFill>
+            <a:schemeClr val="accent4"/>
+          </a:solidFill>
         </p:spPr>
         <p:style>
           <a:lnRef idx="2">
@@ -3703,6 +3706,9 @@
           <a:prstGeom prst="roundRect">
             <a:avLst/>
           </a:prstGeom>
+          <a:solidFill>
+            <a:schemeClr val="accent4"/>
+          </a:solidFill>
         </p:spPr>
         <p:style>
           <a:lnRef idx="2">
@@ -4176,6 +4182,9 @@
           <a:prstGeom prst="roundRect">
             <a:avLst/>
           </a:prstGeom>
+          <a:solidFill>
+            <a:schemeClr val="accent4"/>
+          </a:solidFill>
         </p:spPr>
         <p:style>
           <a:lnRef idx="2">
@@ -4408,7 +4417,9 @@
           <a:prstGeom prst="rect">
             <a:avLst/>
           </a:prstGeom>
-          <a:noFill/>
+          <a:solidFill>
+            <a:schemeClr val="accent4"/>
+          </a:solidFill>
         </p:spPr>
         <p:txBody>
           <a:bodyPr wrap="none" rtlCol="0">
@@ -4485,6 +4496,110 @@
             <a:r>
               <a:rPr lang="en-US" sz="2000" b="1" dirty="0"/>
               <a:t>2</a:t>
+            </a:r>
+            <a:endParaRPr lang="en-IN" sz="2000" b="1" dirty="0"/>
+          </a:p>
+        </p:txBody>
+      </p:sp>
+      <p:cxnSp>
+        <p:nvCxnSpPr>
+          <p:cNvPr id="43" name="Straight Arrow Connector 42"/>
+          <p:cNvCxnSpPr>
+            <a:stCxn id="49" idx="2"/>
+            <a:endCxn id="5" idx="0"/>
+          </p:cNvCxnSpPr>
+          <p:nvPr/>
+        </p:nvCxnSpPr>
+        <p:spPr>
+          <a:xfrm>
+            <a:off x="6083702" y="2369598"/>
+            <a:ext cx="1127098" cy="305319"/>
+          </a:xfrm>
+          <a:prstGeom prst="straightConnector1">
+            <a:avLst/>
+          </a:prstGeom>
+          <a:ln w="38100">
+            <a:tailEnd type="triangle"/>
+          </a:ln>
+        </p:spPr>
+        <p:style>
+          <a:lnRef idx="1">
+            <a:schemeClr val="accent1"/>
+          </a:lnRef>
+          <a:fillRef idx="0">
+            <a:schemeClr val="accent1"/>
+          </a:fillRef>
+          <a:effectRef idx="0">
+            <a:schemeClr val="accent1"/>
+          </a:effectRef>
+          <a:fontRef idx="minor">
+            <a:schemeClr val="tx1"/>
+          </a:fontRef>
+        </p:style>
+      </p:cxnSp>
+      <p:cxnSp>
+        <p:nvCxnSpPr>
+          <p:cNvPr id="46" name="Straight Arrow Connector 45"/>
+          <p:cNvCxnSpPr>
+            <a:stCxn id="5" idx="2"/>
+            <a:endCxn id="6" idx="0"/>
+          </p:cNvCxnSpPr>
+          <p:nvPr/>
+        </p:nvCxnSpPr>
+        <p:spPr>
+          <a:xfrm>
+            <a:off x="7210800" y="3178917"/>
+            <a:ext cx="1807553" cy="524300"/>
+          </a:xfrm>
+          <a:prstGeom prst="straightConnector1">
+            <a:avLst/>
+          </a:prstGeom>
+          <a:ln w="38100">
+            <a:tailEnd type="triangle"/>
+          </a:ln>
+        </p:spPr>
+        <p:style>
+          <a:lnRef idx="1">
+            <a:schemeClr val="accent1"/>
+          </a:lnRef>
+          <a:fillRef idx="0">
+            <a:schemeClr val="accent1"/>
+          </a:fillRef>
+          <a:effectRef idx="0">
+            <a:schemeClr val="accent1"/>
+          </a:effectRef>
+          <a:fontRef idx="minor">
+            <a:schemeClr val="tx1"/>
+          </a:fontRef>
+        </p:style>
+      </p:cxnSp>
+      <p:sp>
+        <p:nvSpPr>
+          <p:cNvPr id="49" name="TextBox 48"/>
+          <p:cNvSpPr txBox="1"/>
+          <p:nvPr/>
+        </p:nvSpPr>
+        <p:spPr>
+          <a:xfrm>
+            <a:off x="5791795" y="1969488"/>
+            <a:ext cx="583814" cy="400110"/>
+          </a:xfrm>
+          <a:prstGeom prst="rect">
+            <a:avLst/>
+          </a:prstGeom>
+          <a:solidFill>
+            <a:schemeClr val="accent4"/>
+          </a:solidFill>
+        </p:spPr>
+        <p:txBody>
+          <a:bodyPr wrap="none" rtlCol="0">
+            <a:spAutoFit/>
+          </a:bodyPr>
+          <a:lstStyle/>
+          <a:p>
+            <a:r>
+              <a:rPr lang="en-US" sz="2000" b="1" dirty="0" smtClean="0"/>
+              <a:t>curl</a:t>
             </a:r>
             <a:endParaRPr lang="en-IN" sz="2000" b="1" dirty="0"/>
           </a:p>

</xml_diff>